<commit_message>
Added initial reports in both .docx and .pdf formats, updated RNN Results with new experiments, and modified scripts to work with different output targets and input types.
</commit_message>
<xml_diff>
--- a/plans_and_presentations/Progress Made 22-05 to 04-06.pptx
+++ b/plans_and_presentations/Progress Made 22-05 to 04-06.pptx
@@ -269,7 +269,7 @@
           <a:p>
             <a:fld id="{DA623554-12B7-4385-BEBD-823DF00BAE7A}" type="datetimeFigureOut">
               <a:rPr lang="en-GB" smtClean="0"/>
-              <a:t>04/06/2019</a:t>
+              <a:t>05/06/2019</a:t>
             </a:fld>
             <a:endParaRPr lang="en-GB"/>
           </a:p>
@@ -469,7 +469,7 @@
           <a:p>
             <a:fld id="{DA623554-12B7-4385-BEBD-823DF00BAE7A}" type="datetimeFigureOut">
               <a:rPr lang="en-GB" smtClean="0"/>
-              <a:t>04/06/2019</a:t>
+              <a:t>05/06/2019</a:t>
             </a:fld>
             <a:endParaRPr lang="en-GB"/>
           </a:p>
@@ -679,7 +679,7 @@
           <a:p>
             <a:fld id="{DA623554-12B7-4385-BEBD-823DF00BAE7A}" type="datetimeFigureOut">
               <a:rPr lang="en-GB" smtClean="0"/>
-              <a:t>04/06/2019</a:t>
+              <a:t>05/06/2019</a:t>
             </a:fld>
             <a:endParaRPr lang="en-GB"/>
           </a:p>
@@ -879,7 +879,7 @@
           <a:p>
             <a:fld id="{DA623554-12B7-4385-BEBD-823DF00BAE7A}" type="datetimeFigureOut">
               <a:rPr lang="en-GB" smtClean="0"/>
-              <a:t>04/06/2019</a:t>
+              <a:t>05/06/2019</a:t>
             </a:fld>
             <a:endParaRPr lang="en-GB"/>
           </a:p>
@@ -1155,7 +1155,7 @@
           <a:p>
             <a:fld id="{DA623554-12B7-4385-BEBD-823DF00BAE7A}" type="datetimeFigureOut">
               <a:rPr lang="en-GB" smtClean="0"/>
-              <a:t>04/06/2019</a:t>
+              <a:t>05/06/2019</a:t>
             </a:fld>
             <a:endParaRPr lang="en-GB"/>
           </a:p>
@@ -1423,7 +1423,7 @@
           <a:p>
             <a:fld id="{DA623554-12B7-4385-BEBD-823DF00BAE7A}" type="datetimeFigureOut">
               <a:rPr lang="en-GB" smtClean="0"/>
-              <a:t>04/06/2019</a:t>
+              <a:t>05/06/2019</a:t>
             </a:fld>
             <a:endParaRPr lang="en-GB"/>
           </a:p>
@@ -1838,7 +1838,7 @@
           <a:p>
             <a:fld id="{DA623554-12B7-4385-BEBD-823DF00BAE7A}" type="datetimeFigureOut">
               <a:rPr lang="en-GB" smtClean="0"/>
-              <a:t>04/06/2019</a:t>
+              <a:t>05/06/2019</a:t>
             </a:fld>
             <a:endParaRPr lang="en-GB"/>
           </a:p>
@@ -1980,7 +1980,7 @@
           <a:p>
             <a:fld id="{DA623554-12B7-4385-BEBD-823DF00BAE7A}" type="datetimeFigureOut">
               <a:rPr lang="en-GB" smtClean="0"/>
-              <a:t>04/06/2019</a:t>
+              <a:t>05/06/2019</a:t>
             </a:fld>
             <a:endParaRPr lang="en-GB"/>
           </a:p>
@@ -2093,7 +2093,7 @@
           <a:p>
             <a:fld id="{DA623554-12B7-4385-BEBD-823DF00BAE7A}" type="datetimeFigureOut">
               <a:rPr lang="en-GB" smtClean="0"/>
-              <a:t>04/06/2019</a:t>
+              <a:t>05/06/2019</a:t>
             </a:fld>
             <a:endParaRPr lang="en-GB"/>
           </a:p>
@@ -2406,7 +2406,7 @@
           <a:p>
             <a:fld id="{DA623554-12B7-4385-BEBD-823DF00BAE7A}" type="datetimeFigureOut">
               <a:rPr lang="en-GB" smtClean="0"/>
-              <a:t>04/06/2019</a:t>
+              <a:t>05/06/2019</a:t>
             </a:fld>
             <a:endParaRPr lang="en-GB"/>
           </a:p>
@@ -2695,7 +2695,7 @@
           <a:p>
             <a:fld id="{DA623554-12B7-4385-BEBD-823DF00BAE7A}" type="datetimeFigureOut">
               <a:rPr lang="en-GB" smtClean="0"/>
-              <a:t>04/06/2019</a:t>
+              <a:t>05/06/2019</a:t>
             </a:fld>
             <a:endParaRPr lang="en-GB"/>
           </a:p>
@@ -2938,7 +2938,7 @@
           <a:p>
             <a:fld id="{DA623554-12B7-4385-BEBD-823DF00BAE7A}" type="datetimeFigureOut">
               <a:rPr lang="en-GB" smtClean="0"/>
-              <a:t>04/06/2019</a:t>
+              <a:t>05/06/2019</a:t>
             </a:fld>
             <a:endParaRPr lang="en-GB"/>
           </a:p>
@@ -4618,7 +4618,7 @@
         <p:spPr>
           <a:xfrm>
             <a:off x="4400103" y="3413575"/>
-            <a:ext cx="2328581" cy="369332"/>
+            <a:ext cx="2328581" cy="646331"/>
           </a:xfrm>
           <a:prstGeom prst="rect">
             <a:avLst/>
@@ -4633,7 +4633,7 @@
           <a:p>
             <a:r>
               <a:rPr lang="en-GB" dirty="0"/>
-              <a:t>Identical data into .csv</a:t>
+              <a:t>‘JA_D4.csv’ (identical data into .csv)</a:t>
             </a:r>
           </a:p>
         </p:txBody>
@@ -6211,7 +6211,7 @@
           <a:p>
             <a:r>
               <a:rPr lang="en-GB" sz="1400" dirty="0"/>
-              <a:t>~36</a:t>
+              <a:t>~360</a:t>
             </a:r>
           </a:p>
         </p:txBody>

</xml_diff>

<commit_message>
Added 'GraphCreator.py' another presentation, and numerous other changes to 'Source'.
</commit_message>
<xml_diff>
--- a/plans_and_presentations/Progress Made 22-05 to 04-06.pptx
+++ b/plans_and_presentations/Progress Made 22-05 to 04-06.pptx
@@ -269,7 +269,7 @@
           <a:p>
             <a:fld id="{DA623554-12B7-4385-BEBD-823DF00BAE7A}" type="datetimeFigureOut">
               <a:rPr lang="en-GB" smtClean="0"/>
-              <a:t>05/06/2019</a:t>
+              <a:t>22/06/2019</a:t>
             </a:fld>
             <a:endParaRPr lang="en-GB"/>
           </a:p>
@@ -469,7 +469,7 @@
           <a:p>
             <a:fld id="{DA623554-12B7-4385-BEBD-823DF00BAE7A}" type="datetimeFigureOut">
               <a:rPr lang="en-GB" smtClean="0"/>
-              <a:t>05/06/2019</a:t>
+              <a:t>22/06/2019</a:t>
             </a:fld>
             <a:endParaRPr lang="en-GB"/>
           </a:p>
@@ -679,7 +679,7 @@
           <a:p>
             <a:fld id="{DA623554-12B7-4385-BEBD-823DF00BAE7A}" type="datetimeFigureOut">
               <a:rPr lang="en-GB" smtClean="0"/>
-              <a:t>05/06/2019</a:t>
+              <a:t>22/06/2019</a:t>
             </a:fld>
             <a:endParaRPr lang="en-GB"/>
           </a:p>
@@ -879,7 +879,7 @@
           <a:p>
             <a:fld id="{DA623554-12B7-4385-BEBD-823DF00BAE7A}" type="datetimeFigureOut">
               <a:rPr lang="en-GB" smtClean="0"/>
-              <a:t>05/06/2019</a:t>
+              <a:t>22/06/2019</a:t>
             </a:fld>
             <a:endParaRPr lang="en-GB"/>
           </a:p>
@@ -1155,7 +1155,7 @@
           <a:p>
             <a:fld id="{DA623554-12B7-4385-BEBD-823DF00BAE7A}" type="datetimeFigureOut">
               <a:rPr lang="en-GB" smtClean="0"/>
-              <a:t>05/06/2019</a:t>
+              <a:t>22/06/2019</a:t>
             </a:fld>
             <a:endParaRPr lang="en-GB"/>
           </a:p>
@@ -1423,7 +1423,7 @@
           <a:p>
             <a:fld id="{DA623554-12B7-4385-BEBD-823DF00BAE7A}" type="datetimeFigureOut">
               <a:rPr lang="en-GB" smtClean="0"/>
-              <a:t>05/06/2019</a:t>
+              <a:t>22/06/2019</a:t>
             </a:fld>
             <a:endParaRPr lang="en-GB"/>
           </a:p>
@@ -1838,7 +1838,7 @@
           <a:p>
             <a:fld id="{DA623554-12B7-4385-BEBD-823DF00BAE7A}" type="datetimeFigureOut">
               <a:rPr lang="en-GB" smtClean="0"/>
-              <a:t>05/06/2019</a:t>
+              <a:t>22/06/2019</a:t>
             </a:fld>
             <a:endParaRPr lang="en-GB"/>
           </a:p>
@@ -1980,7 +1980,7 @@
           <a:p>
             <a:fld id="{DA623554-12B7-4385-BEBD-823DF00BAE7A}" type="datetimeFigureOut">
               <a:rPr lang="en-GB" smtClean="0"/>
-              <a:t>05/06/2019</a:t>
+              <a:t>22/06/2019</a:t>
             </a:fld>
             <a:endParaRPr lang="en-GB"/>
           </a:p>
@@ -2093,7 +2093,7 @@
           <a:p>
             <a:fld id="{DA623554-12B7-4385-BEBD-823DF00BAE7A}" type="datetimeFigureOut">
               <a:rPr lang="en-GB" smtClean="0"/>
-              <a:t>05/06/2019</a:t>
+              <a:t>22/06/2019</a:t>
             </a:fld>
             <a:endParaRPr lang="en-GB"/>
           </a:p>
@@ -2406,7 +2406,7 @@
           <a:p>
             <a:fld id="{DA623554-12B7-4385-BEBD-823DF00BAE7A}" type="datetimeFigureOut">
               <a:rPr lang="en-GB" smtClean="0"/>
-              <a:t>05/06/2019</a:t>
+              <a:t>22/06/2019</a:t>
             </a:fld>
             <a:endParaRPr lang="en-GB"/>
           </a:p>
@@ -2695,7 +2695,7 @@
           <a:p>
             <a:fld id="{DA623554-12B7-4385-BEBD-823DF00BAE7A}" type="datetimeFigureOut">
               <a:rPr lang="en-GB" smtClean="0"/>
-              <a:t>05/06/2019</a:t>
+              <a:t>22/06/2019</a:t>
             </a:fld>
             <a:endParaRPr lang="en-GB"/>
           </a:p>
@@ -2938,7 +2938,7 @@
           <a:p>
             <a:fld id="{DA623554-12B7-4385-BEBD-823DF00BAE7A}" type="datetimeFigureOut">
               <a:rPr lang="en-GB" smtClean="0"/>
-              <a:t>05/06/2019</a:t>
+              <a:t>22/06/2019</a:t>
             </a:fld>
             <a:endParaRPr lang="en-GB"/>
           </a:p>
@@ -6973,7 +6973,7 @@
         </p:nvSpPr>
         <p:spPr>
           <a:xfrm>
-            <a:off x="1214719" y="5267025"/>
+            <a:off x="1225923" y="5267025"/>
             <a:ext cx="8814547" cy="1200329"/>
           </a:xfrm>
           <a:prstGeom prst="rect">

</xml_diff>